<commit_message>
Updated the presentation to a newer one
</commit_message>
<xml_diff>
--- a/presentation.pptx
+++ b/presentation.pptx
@@ -121,7 +121,9 @@
 <file path=ppt/revisionInfo.xml><?xml version="1.0" encoding="utf-8"?>
 <p1510:revInfo xmlns:a="http://schemas.openxmlformats.org/drawingml/2006/main" xmlns:r="http://schemas.openxmlformats.org/officeDocument/2006/relationships" xmlns:p1510="http://schemas.microsoft.com/office/powerpoint/2015/10/main">
   <p1510:revLst>
+    <p1510:client id="{0E496B8A-6472-4048-88AA-C8C17F21DB92}" v="20" dt="2022-01-14T17:15:40.407"/>
     <p1510:client id="{14FDAF6C-D697-4553-9922-3084289E73DF}" v="206" dt="2021-12-19T08:11:25.647"/>
+    <p1510:client id="{31A8FF07-5469-4466-9336-D1E8156BB349}" v="3" dt="2022-01-15T06:04:47.711"/>
     <p1510:client id="{47323D70-CFC1-40C3-B8C5-9C0373041112}" v="7" dt="2021-12-19T11:50:58.592"/>
     <p1510:client id="{5D8BEB61-6E1E-4A12-BDA6-7EF29CADA856}" v="1737" dt="2021-12-19T11:21:25.718"/>
     <p1510:client id="{6A871141-A19C-4F8C-BBC5-1175E155FC34}" v="442" dt="2021-12-24T09:35:46.105"/>
@@ -261,7 +263,7 @@
           <a:p>
             <a:fld id="{C764DE79-268F-4C1A-8933-263129D2AF90}" type="datetimeFigureOut">
               <a:rPr lang="en-US" dirty="0"/>
-              <a:t>12/24/2021</a:t>
+              <a:t>1/14/2022</a:t>
             </a:fld>
             <a:endParaRPr lang="en-US"/>
           </a:p>
@@ -429,7 +431,7 @@
           <a:p>
             <a:fld id="{C764DE79-268F-4C1A-8933-263129D2AF90}" type="datetimeFigureOut">
               <a:rPr lang="en-US" dirty="0"/>
-              <a:t>12/24/2021</a:t>
+              <a:t>1/14/2022</a:t>
             </a:fld>
             <a:endParaRPr lang="en-US"/>
           </a:p>
@@ -607,7 +609,7 @@
           <a:p>
             <a:fld id="{C764DE79-268F-4C1A-8933-263129D2AF90}" type="datetimeFigureOut">
               <a:rPr lang="en-US" dirty="0"/>
-              <a:t>12/24/2021</a:t>
+              <a:t>1/14/2022</a:t>
             </a:fld>
             <a:endParaRPr lang="en-US"/>
           </a:p>
@@ -775,7 +777,7 @@
           <a:p>
             <a:fld id="{C764DE79-268F-4C1A-8933-263129D2AF90}" type="datetimeFigureOut">
               <a:rPr lang="en-US" dirty="0"/>
-              <a:t>12/24/2021</a:t>
+              <a:t>1/14/2022</a:t>
             </a:fld>
             <a:endParaRPr lang="en-US"/>
           </a:p>
@@ -1020,7 +1022,7 @@
           <a:p>
             <a:fld id="{C764DE79-268F-4C1A-8933-263129D2AF90}" type="datetimeFigureOut">
               <a:rPr lang="en-US" dirty="0"/>
-              <a:t>12/24/2021</a:t>
+              <a:t>1/14/2022</a:t>
             </a:fld>
             <a:endParaRPr lang="en-US"/>
           </a:p>
@@ -1249,7 +1251,7 @@
           <a:p>
             <a:fld id="{C764DE79-268F-4C1A-8933-263129D2AF90}" type="datetimeFigureOut">
               <a:rPr lang="en-US" dirty="0"/>
-              <a:t>12/24/2021</a:t>
+              <a:t>1/14/2022</a:t>
             </a:fld>
             <a:endParaRPr lang="en-US"/>
           </a:p>
@@ -1613,7 +1615,7 @@
           <a:p>
             <a:fld id="{C764DE79-268F-4C1A-8933-263129D2AF90}" type="datetimeFigureOut">
               <a:rPr lang="en-US" dirty="0"/>
-              <a:t>12/24/2021</a:t>
+              <a:t>1/14/2022</a:t>
             </a:fld>
             <a:endParaRPr lang="en-US"/>
           </a:p>
@@ -1730,7 +1732,7 @@
           <a:p>
             <a:fld id="{C764DE79-268F-4C1A-8933-263129D2AF90}" type="datetimeFigureOut">
               <a:rPr lang="en-US" dirty="0"/>
-              <a:t>12/24/2021</a:t>
+              <a:t>1/14/2022</a:t>
             </a:fld>
             <a:endParaRPr lang="en-US"/>
           </a:p>
@@ -1825,7 +1827,7 @@
           <a:p>
             <a:fld id="{C764DE79-268F-4C1A-8933-263129D2AF90}" type="datetimeFigureOut">
               <a:rPr lang="en-US" dirty="0"/>
-              <a:t>12/24/2021</a:t>
+              <a:t>1/14/2022</a:t>
             </a:fld>
             <a:endParaRPr lang="en-US"/>
           </a:p>
@@ -2100,7 +2102,7 @@
           <a:p>
             <a:fld id="{C764DE79-268F-4C1A-8933-263129D2AF90}" type="datetimeFigureOut">
               <a:rPr lang="en-US" dirty="0"/>
-              <a:t>12/24/2021</a:t>
+              <a:t>1/14/2022</a:t>
             </a:fld>
             <a:endParaRPr lang="en-US"/>
           </a:p>
@@ -2352,7 +2354,7 @@
           <a:p>
             <a:fld id="{C764DE79-268F-4C1A-8933-263129D2AF90}" type="datetimeFigureOut">
               <a:rPr lang="en-US" dirty="0"/>
-              <a:t>12/24/2021</a:t>
+              <a:t>1/14/2022</a:t>
             </a:fld>
             <a:endParaRPr lang="en-US"/>
           </a:p>
@@ -2563,7 +2565,7 @@
           <a:p>
             <a:fld id="{C764DE79-268F-4C1A-8933-263129D2AF90}" type="datetimeFigureOut">
               <a:rPr lang="en-US" dirty="0"/>
-              <a:t>12/24/2021</a:t>
+              <a:t>1/14/2022</a:t>
             </a:fld>
             <a:endParaRPr lang="en-US"/>
           </a:p>
@@ -4354,7 +4356,7 @@
         </p:nvSpPr>
         <p:spPr>
           <a:xfrm>
-            <a:off x="1891023" y="3577831"/>
+            <a:off x="2006042" y="3319039"/>
             <a:ext cx="8563987" cy="2935149"/>
           </a:xfrm>
         </p:spPr>
@@ -4366,17 +4368,17 @@
           <a:p>
             <a:pPr algn="l"/>
             <a:r>
-              <a:rPr lang="ru-RU" sz="3200">
+              <a:rPr lang="ru-RU" sz="3200" dirty="0">
                 <a:latin typeface="Segoe UI Light"/>
                 <a:cs typeface="Calibri"/>
               </a:rPr>
-              <a:t>Итак, я сделал программу, цель и тема которой - калькулятор, который может выводить результат в трёх системах счисления.</a:t>
+              <a:t>Итак, я сделал программу, цель и тема которой - "калькулятор", который может считать исходя из выбранных вариантов и выводить результат в трёх системах счисления.</a:t>
             </a:r>
           </a:p>
           <a:p>
             <a:pPr algn="l"/>
             <a:r>
-              <a:rPr lang="ru-RU" sz="3200">
+              <a:rPr lang="ru-RU" sz="3200" dirty="0">
                 <a:latin typeface="Segoe UI Light"/>
                 <a:cs typeface="Calibri"/>
               </a:rPr>
@@ -7296,35 +7298,6 @@
           </a:p>
         </p:txBody>
       </p:sp>
-      <p:pic>
-        <p:nvPicPr>
-          <p:cNvPr id="4" name="Рисунок 4" descr="Изображение выглядит как текст&#10;&#10;Автоматически созданное описание">
-            <a:extLst>
-              <a:ext uri="{FF2B5EF4-FFF2-40B4-BE49-F238E27FC236}">
-                <a16:creationId xmlns:a16="http://schemas.microsoft.com/office/drawing/2014/main" id="{FAFDC98B-5C8B-46B4-8765-CC8E9B0E1230}"/>
-              </a:ext>
-            </a:extLst>
-          </p:cNvPr>
-          <p:cNvPicPr>
-            <a:picLocks noGrp="1" noChangeAspect="1"/>
-          </p:cNvPicPr>
-          <p:nvPr>
-            <p:ph idx="1"/>
-          </p:nvPr>
-        </p:nvPicPr>
-        <p:blipFill>
-          <a:blip r:embed="rId2"/>
-          <a:stretch>
-            <a:fillRect/>
-          </a:stretch>
-        </p:blipFill>
-        <p:spPr>
-          <a:xfrm>
-            <a:off x="7416511" y="7204229"/>
-            <a:ext cx="1238250" cy="1095375"/>
-          </a:xfrm>
-        </p:spPr>
-      </p:pic>
       <p:pic>
         <p:nvPicPr>
           <p:cNvPr id="7" name="Рисунок 7" descr="Изображение выглядит как текст&#10;&#10;Автоматически созданное описание">

</xml_diff>

<commit_message>
updated presentation to a newer one
</commit_message>
<xml_diff>
--- a/presentation.pptx
+++ b/presentation.pptx
@@ -128,6 +128,7 @@
     <p1510:client id="{5D8BEB61-6E1E-4A12-BDA6-7EF29CADA856}" v="1737" dt="2021-12-19T11:21:25.718"/>
     <p1510:client id="{6A871141-A19C-4F8C-BBC5-1175E155FC34}" v="442" dt="2021-12-24T09:35:46.105"/>
     <p1510:client id="{792E3377-9935-4B56-B5FF-27813EC03AC3}" v="634" dt="2021-12-18T10:21:41.973"/>
+    <p1510:client id="{986CAD33-B9BD-43BC-928B-792818C9E1DD}" v="26" dt="2022-01-16T05:51:10.808"/>
     <p1510:client id="{B3A59D94-64BB-4FA9-9B37-E72AB0EB88AF}" v="1" dt="2021-12-19T11:36:16.717"/>
     <p1510:client id="{E051D234-74F8-4E21-A410-BD41EDD7D90E}" v="3" dt="2021-12-19T11:35:18.424"/>
   </p1510:revLst>
@@ -263,7 +264,7 @@
           <a:p>
             <a:fld id="{C764DE79-268F-4C1A-8933-263129D2AF90}" type="datetimeFigureOut">
               <a:rPr lang="en-US" dirty="0"/>
-              <a:t>1/14/2022</a:t>
+              <a:t>1/15/2022</a:t>
             </a:fld>
             <a:endParaRPr lang="en-US"/>
           </a:p>
@@ -431,7 +432,7 @@
           <a:p>
             <a:fld id="{C764DE79-268F-4C1A-8933-263129D2AF90}" type="datetimeFigureOut">
               <a:rPr lang="en-US" dirty="0"/>
-              <a:t>1/14/2022</a:t>
+              <a:t>1/15/2022</a:t>
             </a:fld>
             <a:endParaRPr lang="en-US"/>
           </a:p>
@@ -609,7 +610,7 @@
           <a:p>
             <a:fld id="{C764DE79-268F-4C1A-8933-263129D2AF90}" type="datetimeFigureOut">
               <a:rPr lang="en-US" dirty="0"/>
-              <a:t>1/14/2022</a:t>
+              <a:t>1/15/2022</a:t>
             </a:fld>
             <a:endParaRPr lang="en-US"/>
           </a:p>
@@ -777,7 +778,7 @@
           <a:p>
             <a:fld id="{C764DE79-268F-4C1A-8933-263129D2AF90}" type="datetimeFigureOut">
               <a:rPr lang="en-US" dirty="0"/>
-              <a:t>1/14/2022</a:t>
+              <a:t>1/15/2022</a:t>
             </a:fld>
             <a:endParaRPr lang="en-US"/>
           </a:p>
@@ -1022,7 +1023,7 @@
           <a:p>
             <a:fld id="{C764DE79-268F-4C1A-8933-263129D2AF90}" type="datetimeFigureOut">
               <a:rPr lang="en-US" dirty="0"/>
-              <a:t>1/14/2022</a:t>
+              <a:t>1/15/2022</a:t>
             </a:fld>
             <a:endParaRPr lang="en-US"/>
           </a:p>
@@ -1251,7 +1252,7 @@
           <a:p>
             <a:fld id="{C764DE79-268F-4C1A-8933-263129D2AF90}" type="datetimeFigureOut">
               <a:rPr lang="en-US" dirty="0"/>
-              <a:t>1/14/2022</a:t>
+              <a:t>1/15/2022</a:t>
             </a:fld>
             <a:endParaRPr lang="en-US"/>
           </a:p>
@@ -1615,7 +1616,7 @@
           <a:p>
             <a:fld id="{C764DE79-268F-4C1A-8933-263129D2AF90}" type="datetimeFigureOut">
               <a:rPr lang="en-US" dirty="0"/>
-              <a:t>1/14/2022</a:t>
+              <a:t>1/15/2022</a:t>
             </a:fld>
             <a:endParaRPr lang="en-US"/>
           </a:p>
@@ -1732,7 +1733,7 @@
           <a:p>
             <a:fld id="{C764DE79-268F-4C1A-8933-263129D2AF90}" type="datetimeFigureOut">
               <a:rPr lang="en-US" dirty="0"/>
-              <a:t>1/14/2022</a:t>
+              <a:t>1/15/2022</a:t>
             </a:fld>
             <a:endParaRPr lang="en-US"/>
           </a:p>
@@ -1827,7 +1828,7 @@
           <a:p>
             <a:fld id="{C764DE79-268F-4C1A-8933-263129D2AF90}" type="datetimeFigureOut">
               <a:rPr lang="en-US" dirty="0"/>
-              <a:t>1/14/2022</a:t>
+              <a:t>1/15/2022</a:t>
             </a:fld>
             <a:endParaRPr lang="en-US"/>
           </a:p>
@@ -2102,7 +2103,7 @@
           <a:p>
             <a:fld id="{C764DE79-268F-4C1A-8933-263129D2AF90}" type="datetimeFigureOut">
               <a:rPr lang="en-US" dirty="0"/>
-              <a:t>1/14/2022</a:t>
+              <a:t>1/15/2022</a:t>
             </a:fld>
             <a:endParaRPr lang="en-US"/>
           </a:p>
@@ -2354,7 +2355,7 @@
           <a:p>
             <a:fld id="{C764DE79-268F-4C1A-8933-263129D2AF90}" type="datetimeFigureOut">
               <a:rPr lang="en-US" dirty="0"/>
-              <a:t>1/14/2022</a:t>
+              <a:t>1/15/2022</a:t>
             </a:fld>
             <a:endParaRPr lang="en-US"/>
           </a:p>
@@ -2565,7 +2566,7 @@
           <a:p>
             <a:fld id="{C764DE79-268F-4C1A-8933-263129D2AF90}" type="datetimeFigureOut">
               <a:rPr lang="en-US" dirty="0"/>
-              <a:t>1/14/2022</a:t>
+              <a:t>1/15/2022</a:t>
             </a:fld>
             <a:endParaRPr lang="en-US"/>
           </a:p>
@@ -5037,7 +5038,7 @@
               <a:buNone/>
             </a:pPr>
             <a:r>
-              <a:rPr lang="ru-RU" sz="3200">
+              <a:rPr lang="ru-RU" sz="3200" dirty="0">
                 <a:latin typeface="Segoe UI Light"/>
                 <a:cs typeface="Calibri"/>
               </a:rPr>
@@ -5058,11 +5059,11 @@
               <a:buNone/>
             </a:pPr>
             <a:r>
-              <a:rPr lang="ru-RU">
+              <a:rPr lang="ru-RU" dirty="0">
                 <a:latin typeface="Segoe UI Light"/>
                 <a:cs typeface="Calibri"/>
               </a:rPr>
-              <a:t>Вообще, было довольно интересно проверить свои знания такого рода программой, которая делает расчёты исходя из выбранных вариантов.</a:t>
+              <a:t>Вообще, было довольно интересно проверить свои знания такого рода программой, которая считает исходя из выбранных вариантов.</a:t>
             </a:r>
           </a:p>
         </p:txBody>
@@ -6152,13 +6153,13 @@
           </a:xfrm>
         </p:spPr>
         <p:txBody>
-          <a:bodyPr vert="horz" lIns="91440" tIns="45720" rIns="91440" bIns="45720" rtlCol="0">
+          <a:bodyPr vert="horz" lIns="91440" tIns="45720" rIns="91440" bIns="45720" rtlCol="0" anchor="t">
             <a:normAutofit/>
           </a:bodyPr>
           <a:lstStyle/>
           <a:p>
             <a:r>
-              <a:rPr lang="ru-RU" sz="2400">
+              <a:rPr lang="ru-RU" sz="2400" dirty="0">
                 <a:latin typeface="Segoe UI Light"/>
                 <a:cs typeface="Calibri" panose="020F0502020204030204"/>
               </a:rPr>
@@ -6173,11 +6174,11 @@
           </a:p>
           <a:p>
             <a:r>
-              <a:rPr lang="ru-RU" sz="2400">
+              <a:rPr lang="ru-RU" sz="2400" dirty="0">
                 <a:latin typeface="Segoe UI Light"/>
                 <a:cs typeface="Calibri" panose="020F0502020204030204"/>
               </a:rPr>
-              <a:t>Я не знал, как правильно сделать, чтобы программа делала расчёт заново в случае отрицательного ответа на вопрос про правильность введённых данных.</a:t>
+              <a:t>Я не знал, как правильно сделать, чтобы программа считала заново в случае отрицательного ответа на вопрос про правильность введённых данных.</a:t>
             </a:r>
           </a:p>
           <a:p>
@@ -7180,7 +7181,7 @@
                 <a:latin typeface="Segoe UI Light"/>
                 <a:cs typeface="Calibri"/>
               </a:rPr>
-              <a:t> расчёты на основе сделанных выборов </a:t>
+              <a:t> вычисление на основе сделанных выборов </a:t>
             </a:r>
             <a:r>
               <a:rPr lang="ru-RU" dirty="0">

</xml_diff>